<commit_message>
update sections of python basics
</commit_message>
<xml_diff>
--- a/2 Python Basics.pptx
+++ b/2 Python Basics.pptx
@@ -14467,7 +14467,7 @@
                   <a:srgbClr val="E6E6E6"/>
                 </a:solidFill>
               </a:rPr>
-              <a:t>3</a:t>
+              <a:t>2</a:t>
             </a:r>
             <a:endParaRPr sz="6000">
               <a:solidFill>
@@ -15003,7 +15003,7 @@
                   <a:srgbClr val="E6E6E6"/>
                 </a:solidFill>
               </a:rPr>
-              <a:t>1</a:t>
+              <a:t>0</a:t>
             </a:r>
             <a:endParaRPr sz="6000">
               <a:solidFill>
@@ -15952,7 +15952,7 @@
                   <a:srgbClr val="E6E6E6"/>
                 </a:solidFill>
               </a:rPr>
-              <a:t>4</a:t>
+              <a:t>3</a:t>
             </a:r>
             <a:endParaRPr sz="6000">
               <a:solidFill>
@@ -17591,7 +17591,7 @@
                   <a:srgbClr val="E6E6E6"/>
                 </a:solidFill>
               </a:rPr>
-              <a:t>5</a:t>
+              <a:t>4</a:t>
             </a:r>
             <a:endParaRPr sz="6000">
               <a:solidFill>
@@ -19397,7 +19397,7 @@
                   <a:srgbClr val="E6E6E6"/>
                 </a:solidFill>
               </a:rPr>
-              <a:t>6</a:t>
+              <a:t>5</a:t>
             </a:r>
             <a:endParaRPr sz="6000">
               <a:solidFill>
@@ -20946,7 +20946,7 @@
                   <a:srgbClr val="E6E6E6"/>
                 </a:solidFill>
               </a:rPr>
-              <a:t>2</a:t>
+              <a:t>1</a:t>
             </a:r>
             <a:endParaRPr sz="6000">
               <a:solidFill>

</xml_diff>